<commit_message>
Update Detection Fake News with NLP model.pptx
</commit_message>
<xml_diff>
--- a/Doc/Detection Fake News with NLP model.pptx
+++ b/Doc/Detection Fake News with NLP model.pptx
@@ -5,15 +5,14 @@
     <p:sldMasterId id="2147483876" r:id="rId1"/>
   </p:sldMasterIdLst>
   <p:notesMasterIdLst>
-    <p:notesMasterId r:id="rId8"/>
+    <p:notesMasterId r:id="rId7"/>
   </p:notesMasterIdLst>
   <p:sldIdLst>
     <p:sldId id="256" r:id="rId2"/>
     <p:sldId id="258" r:id="rId3"/>
     <p:sldId id="265" r:id="rId4"/>
     <p:sldId id="264" r:id="rId5"/>
-    <p:sldId id="261" r:id="rId6"/>
-    <p:sldId id="260" r:id="rId7"/>
+    <p:sldId id="260" r:id="rId6"/>
   </p:sldIdLst>
   <p:sldSz cx="12192000" cy="6858000"/>
   <p:notesSz cx="6858000" cy="9144000"/>
@@ -1012,7 +1011,7 @@
         <a:lstStyle/>
         <a:p>
           <a:r>
-            <a:rPr lang="en-US" b="1">
+            <a:rPr lang="en-US" b="1" dirty="0">
               <a:solidFill>
                 <a:schemeClr val="tx1"/>
               </a:solidFill>
@@ -1022,18 +1021,13 @@
         </a:p>
         <a:p>
           <a:r>
-            <a:rPr lang="en-US">
+            <a:rPr lang="en-US" dirty="0">
               <a:solidFill>
                 <a:schemeClr val="tx1"/>
               </a:solidFill>
             </a:rPr>
             <a:t>(TF-IDF, Word2Vec)</a:t>
           </a:r>
-          <a:endParaRPr lang="en-US" dirty="0">
-            <a:solidFill>
-              <a:schemeClr val="tx1"/>
-            </a:solidFill>
-          </a:endParaRPr>
         </a:p>
       </dgm:t>
     </dgm:pt>
@@ -1075,7 +1069,7 @@
         <a:lstStyle/>
         <a:p>
           <a:r>
-            <a:rPr lang="en-US" b="1">
+            <a:rPr lang="en-US" b="1" dirty="0">
               <a:solidFill>
                 <a:schemeClr val="tx1"/>
               </a:solidFill>
@@ -1085,7 +1079,7 @@
         </a:p>
         <a:p>
           <a:r>
-            <a:rPr lang="en-US">
+            <a:rPr lang="en-US" dirty="0">
               <a:solidFill>
                 <a:schemeClr val="tx1"/>
               </a:solidFill>
@@ -1095,7 +1089,7 @@
         </a:p>
         <a:p>
           <a:r>
-            <a:rPr lang="en-US">
+            <a:rPr lang="en-US" dirty="0">
               <a:solidFill>
                 <a:schemeClr val="tx1"/>
               </a:solidFill>
@@ -1105,7 +1099,7 @@
         </a:p>
         <a:p>
           <a:r>
-            <a:rPr lang="en-US">
+            <a:rPr lang="en-US" dirty="0">
               <a:solidFill>
                 <a:schemeClr val="tx1"/>
               </a:solidFill>
@@ -1115,18 +1109,13 @@
         </a:p>
         <a:p>
           <a:r>
-            <a:rPr lang="en-US">
+            <a:rPr lang="en-US" dirty="0">
               <a:solidFill>
                 <a:schemeClr val="tx1"/>
               </a:solidFill>
             </a:rPr>
             <a:t>SVM)</a:t>
           </a:r>
-          <a:endParaRPr lang="en-US" dirty="0">
-            <a:solidFill>
-              <a:schemeClr val="tx1"/>
-            </a:solidFill>
-          </a:endParaRPr>
         </a:p>
       </dgm:t>
     </dgm:pt>
@@ -1668,7 +1657,7 @@
             <a:buNone/>
           </a:pPr>
           <a:r>
-            <a:rPr lang="en-US" sz="1800" b="1" kern="1200">
+            <a:rPr lang="en-US" sz="1800" b="1" kern="1200" dirty="0">
               <a:solidFill>
                 <a:schemeClr val="tx1"/>
               </a:solidFill>
@@ -1690,18 +1679,13 @@
             <a:buNone/>
           </a:pPr>
           <a:r>
-            <a:rPr lang="en-US" sz="1800" kern="1200">
+            <a:rPr lang="en-US" sz="1800" kern="1200" dirty="0">
               <a:solidFill>
                 <a:schemeClr val="tx1"/>
               </a:solidFill>
             </a:rPr>
             <a:t>(TF-IDF, Word2Vec)</a:t>
           </a:r>
-          <a:endParaRPr lang="en-US" sz="1800" kern="1200" dirty="0">
-            <a:solidFill>
-              <a:schemeClr val="tx1"/>
-            </a:solidFill>
-          </a:endParaRPr>
         </a:p>
       </dsp:txBody>
       <dsp:txXfrm>
@@ -1838,7 +1822,7 @@
             <a:buNone/>
           </a:pPr>
           <a:r>
-            <a:rPr lang="en-US" sz="1800" b="1" kern="1200">
+            <a:rPr lang="en-US" sz="1800" b="1" kern="1200" dirty="0">
               <a:solidFill>
                 <a:schemeClr val="tx1"/>
               </a:solidFill>
@@ -1860,7 +1844,7 @@
             <a:buNone/>
           </a:pPr>
           <a:r>
-            <a:rPr lang="en-US" sz="1800" kern="1200">
+            <a:rPr lang="en-US" sz="1800" kern="1200" dirty="0">
               <a:solidFill>
                 <a:schemeClr val="tx1"/>
               </a:solidFill>
@@ -1882,7 +1866,7 @@
             <a:buNone/>
           </a:pPr>
           <a:r>
-            <a:rPr lang="en-US" sz="1800" kern="1200">
+            <a:rPr lang="en-US" sz="1800" kern="1200" dirty="0">
               <a:solidFill>
                 <a:schemeClr val="tx1"/>
               </a:solidFill>
@@ -1904,7 +1888,7 @@
             <a:buNone/>
           </a:pPr>
           <a:r>
-            <a:rPr lang="en-US" sz="1800" kern="1200">
+            <a:rPr lang="en-US" sz="1800" kern="1200" dirty="0">
               <a:solidFill>
                 <a:schemeClr val="tx1"/>
               </a:solidFill>
@@ -1926,18 +1910,13 @@
             <a:buNone/>
           </a:pPr>
           <a:r>
-            <a:rPr lang="en-US" sz="1800" kern="1200">
+            <a:rPr lang="en-US" sz="1800" kern="1200" dirty="0">
               <a:solidFill>
                 <a:schemeClr val="tx1"/>
               </a:solidFill>
             </a:rPr>
             <a:t>SVM)</a:t>
           </a:r>
-          <a:endParaRPr lang="en-US" sz="1800" kern="1200" dirty="0">
-            <a:solidFill>
-              <a:schemeClr val="tx1"/>
-            </a:solidFill>
-          </a:endParaRPr>
         </a:p>
       </dsp:txBody>
       <dsp:txXfrm>
@@ -3544,7 +3523,7 @@
           <a:p>
             <a:fld id="{4FA234E5-B623-4332-9AF5-1617B9276778}" type="slidenum">
               <a:rPr lang="en-US" smtClean="0"/>
-              <a:t>6</a:t>
+              <a:t>5</a:t>
             </a:fld>
             <a:endParaRPr lang="en-US"/>
           </a:p>
@@ -7361,7 +7340,7 @@
         </p:nvSpPr>
         <p:spPr>
           <a:xfrm>
-            <a:off x="804672" y="723578"/>
+            <a:off x="554982" y="786847"/>
             <a:ext cx="3387106" cy="1645501"/>
           </a:xfrm>
         </p:spPr>
@@ -7371,8 +7350,12 @@
           </a:bodyPr>
           <a:lstStyle/>
           <a:p>
+            <a:pPr algn="ctr"/>
             <a:r>
               <a:rPr lang="en-US" sz="4400" b="1" i="0" dirty="0">
+                <a:solidFill>
+                  <a:schemeClr val="bg1"/>
+                </a:solidFill>
                 <a:effectLst/>
                 <a:latin typeface="+mn-lt"/>
                 <a:ea typeface="Tahoma" panose="020B0604030504040204" pitchFamily="34" charset="0"/>
@@ -7381,6 +7364,9 @@
               <a:t>NLP</a:t>
             </a:r>
             <a:endParaRPr lang="en-US" dirty="0">
+              <a:solidFill>
+                <a:schemeClr val="bg1"/>
+              </a:solidFill>
               <a:latin typeface="+mn-lt"/>
             </a:endParaRPr>
           </a:p>
@@ -7404,7 +7390,7 @@
         </p:nvSpPr>
         <p:spPr>
           <a:xfrm>
-            <a:off x="804672" y="2548467"/>
+            <a:off x="554983" y="2442658"/>
             <a:ext cx="3387105" cy="3628495"/>
           </a:xfrm>
         </p:spPr>
@@ -7414,11 +7400,17 @@
           </a:bodyPr>
           <a:lstStyle/>
           <a:p>
-            <a:pPr marL="0" indent="0">
+            <a:pPr marL="0" indent="0" algn="ctr">
+              <a:lnSpc>
+                <a:spcPct val="200000"/>
+              </a:lnSpc>
               <a:buNone/>
             </a:pPr>
             <a:r>
-              <a:rPr lang="th-TH" sz="1800" i="0" dirty="0">
+              <a:rPr lang="th-TH" sz="2000" i="0" dirty="0">
+                <a:solidFill>
+                  <a:schemeClr val="bg1"/>
+                </a:solidFill>
                 <a:effectLst/>
                 <a:ea typeface="Tahoma" panose="020B0604030504040204" pitchFamily="34" charset="0"/>
                 <a:cs typeface="Tahoma" panose="020B0604030504040204" pitchFamily="34" charset="0"/>
@@ -7426,14 +7418,20 @@
               <a:t>ใช้ </a:t>
             </a:r>
             <a:r>
-              <a:rPr lang="en-US" sz="1800" dirty="0">
+              <a:rPr lang="en-US" sz="2000" dirty="0">
+                <a:solidFill>
+                  <a:schemeClr val="bg1"/>
+                </a:solidFill>
                 <a:ea typeface="Tahoma" panose="020B0604030504040204" pitchFamily="34" charset="0"/>
                 <a:cs typeface="Tahoma" panose="020B0604030504040204" pitchFamily="34" charset="0"/>
               </a:rPr>
               <a:t>M</a:t>
             </a:r>
             <a:r>
-              <a:rPr lang="en-US" sz="1800" i="0" dirty="0">
+              <a:rPr lang="en-US" sz="2000" i="0" dirty="0">
+                <a:solidFill>
+                  <a:schemeClr val="bg1"/>
+                </a:solidFill>
                 <a:effectLst/>
                 <a:ea typeface="Tahoma" panose="020B0604030504040204" pitchFamily="34" charset="0"/>
                 <a:cs typeface="Tahoma" panose="020B0604030504040204" pitchFamily="34" charset="0"/>
@@ -7441,14 +7439,20 @@
               <a:t>achine </a:t>
             </a:r>
             <a:r>
-              <a:rPr lang="en-US" sz="1800" dirty="0">
+              <a:rPr lang="en-US" sz="2000" dirty="0">
+                <a:solidFill>
+                  <a:schemeClr val="bg1"/>
+                </a:solidFill>
                 <a:ea typeface="Tahoma" panose="020B0604030504040204" pitchFamily="34" charset="0"/>
                 <a:cs typeface="Tahoma" panose="020B0604030504040204" pitchFamily="34" charset="0"/>
               </a:rPr>
               <a:t>L</a:t>
             </a:r>
             <a:r>
-              <a:rPr lang="en-US" sz="1800" i="0" dirty="0">
+              <a:rPr lang="en-US" sz="2000" i="0" dirty="0">
+                <a:solidFill>
+                  <a:schemeClr val="bg1"/>
+                </a:solidFill>
                 <a:effectLst/>
                 <a:ea typeface="Tahoma" panose="020B0604030504040204" pitchFamily="34" charset="0"/>
                 <a:cs typeface="Tahoma" panose="020B0604030504040204" pitchFamily="34" charset="0"/>
@@ -7456,7 +7460,10 @@
               <a:t>earning Algorithms </a:t>
             </a:r>
             <a:r>
-              <a:rPr lang="th-TH" sz="1800" i="0" dirty="0">
+              <a:rPr lang="th-TH" sz="2000" i="0" dirty="0">
+                <a:solidFill>
+                  <a:schemeClr val="bg1"/>
+                </a:solidFill>
                 <a:effectLst/>
                 <a:ea typeface="Tahoma" panose="020B0604030504040204" pitchFamily="34" charset="0"/>
                 <a:cs typeface="Tahoma" panose="020B0604030504040204" pitchFamily="34" charset="0"/>
@@ -7464,7 +7471,10 @@
               <a:t>กับข้อมูลประเภท </a:t>
             </a:r>
             <a:r>
-              <a:rPr lang="en-US" sz="1800" i="0" dirty="0">
+              <a:rPr lang="en-US" sz="2000" i="0" dirty="0">
+                <a:solidFill>
+                  <a:schemeClr val="bg1"/>
+                </a:solidFill>
                 <a:effectLst/>
                 <a:ea typeface="Tahoma" panose="020B0604030504040204" pitchFamily="34" charset="0"/>
                 <a:cs typeface="Tahoma" panose="020B0604030504040204" pitchFamily="34" charset="0"/>
@@ -7472,7 +7482,10 @@
               <a:t>Text, Speech </a:t>
             </a:r>
             <a:r>
-              <a:rPr lang="th-TH" sz="1800" i="0" dirty="0">
+              <a:rPr lang="th-TH" sz="2000" i="0" dirty="0">
+                <a:solidFill>
+                  <a:schemeClr val="bg1"/>
+                </a:solidFill>
                 <a:effectLst/>
                 <a:ea typeface="Tahoma" panose="020B0604030504040204" pitchFamily="34" charset="0"/>
                 <a:cs typeface="Tahoma" panose="020B0604030504040204" pitchFamily="34" charset="0"/>
@@ -7480,14 +7493,21 @@
               <a:t>หรือแม้แต่ภาพ ซึ่งสามารถประยุกต์ใช้ในงานทางด้าน </a:t>
             </a:r>
             <a:r>
-              <a:rPr lang="en-US" sz="1800" i="0" dirty="0">
+              <a:rPr lang="en-US" sz="2000" i="0" dirty="0">
+                <a:solidFill>
+                  <a:schemeClr val="bg1"/>
+                </a:solidFill>
                 <a:effectLst/>
                 <a:ea typeface="Tahoma" panose="020B0604030504040204" pitchFamily="34" charset="0"/>
                 <a:cs typeface="Tahoma" panose="020B0604030504040204" pitchFamily="34" charset="0"/>
               </a:rPr>
               <a:t>NLP</a:t>
             </a:r>
-            <a:endParaRPr lang="en-US" sz="1800" dirty="0"/>
+            <a:endParaRPr lang="en-US" sz="2000" dirty="0">
+              <a:solidFill>
+                <a:schemeClr val="bg1"/>
+              </a:solidFill>
+            </a:endParaRPr>
           </a:p>
         </p:txBody>
       </p:sp>
@@ -8473,154 +8493,6 @@
           <a:chExt cx="0" cy="0"/>
         </a:xfrm>
       </p:grpSpPr>
-      <p:sp>
-        <p:nvSpPr>
-          <p:cNvPr id="2" name="ชื่อเรื่อง 1">
-            <a:extLst>
-              <a:ext uri="{FF2B5EF4-FFF2-40B4-BE49-F238E27FC236}">
-                <a16:creationId xmlns:a16="http://schemas.microsoft.com/office/drawing/2014/main" id="{B1A22B63-4DDB-49B0-9E14-1B9AD58E5B0E}"/>
-              </a:ext>
-            </a:extLst>
-          </p:cNvPr>
-          <p:cNvSpPr>
-            <a:spLocks noGrp="1"/>
-          </p:cNvSpPr>
-          <p:nvPr>
-            <p:ph type="title"/>
-          </p:nvPr>
-        </p:nvSpPr>
-        <p:spPr>
-          <a:xfrm>
-            <a:off x="804672" y="723578"/>
-            <a:ext cx="3387106" cy="1645501"/>
-          </a:xfrm>
-        </p:spPr>
-        <p:txBody>
-          <a:bodyPr>
-            <a:normAutofit/>
-          </a:bodyPr>
-          <a:lstStyle/>
-          <a:p>
-            <a:r>
-              <a:rPr lang="en-US" sz="4400" b="1" i="0" dirty="0">
-                <a:effectLst/>
-                <a:latin typeface="+mn-lt"/>
-                <a:ea typeface="Tahoma" panose="020B0604030504040204" pitchFamily="34" charset="0"/>
-                <a:cs typeface="Tahoma" panose="020B0604030504040204" pitchFamily="34" charset="0"/>
-              </a:rPr>
-              <a:t>NLP</a:t>
-            </a:r>
-            <a:endParaRPr lang="en-US" dirty="0">
-              <a:latin typeface="+mn-lt"/>
-            </a:endParaRPr>
-          </a:p>
-        </p:txBody>
-      </p:sp>
-      <p:sp>
-        <p:nvSpPr>
-          <p:cNvPr id="3" name="ตัวแทนเนื้อหา 2">
-            <a:extLst>
-              <a:ext uri="{FF2B5EF4-FFF2-40B4-BE49-F238E27FC236}">
-                <a16:creationId xmlns:a16="http://schemas.microsoft.com/office/drawing/2014/main" id="{587A69E1-179D-43FC-BE2C-508BF836A9E9}"/>
-              </a:ext>
-            </a:extLst>
-          </p:cNvPr>
-          <p:cNvSpPr>
-            <a:spLocks noGrp="1"/>
-          </p:cNvSpPr>
-          <p:nvPr>
-            <p:ph idx="1"/>
-          </p:nvPr>
-        </p:nvSpPr>
-        <p:spPr>
-          <a:xfrm>
-            <a:off x="804672" y="2548467"/>
-            <a:ext cx="3387105" cy="3628495"/>
-          </a:xfrm>
-        </p:spPr>
-        <p:txBody>
-          <a:bodyPr>
-            <a:normAutofit/>
-          </a:bodyPr>
-          <a:lstStyle/>
-          <a:p>
-            <a:r>
-              <a:rPr lang="th-TH" sz="1800" i="0" dirty="0">
-                <a:effectLst/>
-                <a:ea typeface="Tahoma" panose="020B0604030504040204" pitchFamily="34" charset="0"/>
-                <a:cs typeface="Tahoma" panose="020B0604030504040204" pitchFamily="34" charset="0"/>
-              </a:rPr>
-              <a:t>ใช้ </a:t>
-            </a:r>
-            <a:r>
-              <a:rPr lang="en-US" sz="1800" dirty="0">
-                <a:ea typeface="Tahoma" panose="020B0604030504040204" pitchFamily="34" charset="0"/>
-                <a:cs typeface="Tahoma" panose="020B0604030504040204" pitchFamily="34" charset="0"/>
-              </a:rPr>
-              <a:t>M</a:t>
-            </a:r>
-            <a:r>
-              <a:rPr lang="en-US" sz="1800" i="0" dirty="0">
-                <a:effectLst/>
-                <a:ea typeface="Tahoma" panose="020B0604030504040204" pitchFamily="34" charset="0"/>
-                <a:cs typeface="Tahoma" panose="020B0604030504040204" pitchFamily="34" charset="0"/>
-              </a:rPr>
-              <a:t>achine </a:t>
-            </a:r>
-            <a:r>
-              <a:rPr lang="en-US" sz="1800" dirty="0">
-                <a:ea typeface="Tahoma" panose="020B0604030504040204" pitchFamily="34" charset="0"/>
-                <a:cs typeface="Tahoma" panose="020B0604030504040204" pitchFamily="34" charset="0"/>
-              </a:rPr>
-              <a:t>L</a:t>
-            </a:r>
-            <a:r>
-              <a:rPr lang="en-US" sz="1800" i="0" dirty="0">
-                <a:effectLst/>
-                <a:ea typeface="Tahoma" panose="020B0604030504040204" pitchFamily="34" charset="0"/>
-                <a:cs typeface="Tahoma" panose="020B0604030504040204" pitchFamily="34" charset="0"/>
-              </a:rPr>
-              <a:t>earning Algorithms </a:t>
-            </a:r>
-            <a:r>
-              <a:rPr lang="th-TH" sz="1800" i="0" dirty="0">
-                <a:effectLst/>
-                <a:ea typeface="Tahoma" panose="020B0604030504040204" pitchFamily="34" charset="0"/>
-                <a:cs typeface="Tahoma" panose="020B0604030504040204" pitchFamily="34" charset="0"/>
-              </a:rPr>
-              <a:t>กับข้อมูลประเภท </a:t>
-            </a:r>
-            <a:r>
-              <a:rPr lang="en-US" sz="1800" i="0" dirty="0">
-                <a:effectLst/>
-                <a:ea typeface="Tahoma" panose="020B0604030504040204" pitchFamily="34" charset="0"/>
-                <a:cs typeface="Tahoma" panose="020B0604030504040204" pitchFamily="34" charset="0"/>
-              </a:rPr>
-              <a:t>Text, Speech </a:t>
-            </a:r>
-            <a:r>
-              <a:rPr lang="th-TH" sz="1800" i="0" dirty="0">
-                <a:effectLst/>
-                <a:ea typeface="Tahoma" panose="020B0604030504040204" pitchFamily="34" charset="0"/>
-                <a:cs typeface="Tahoma" panose="020B0604030504040204" pitchFamily="34" charset="0"/>
-              </a:rPr>
-              <a:t>หรือแม้แต่ภาพ ซึ่งสามารถประยุกต์ใช้ในงานทางด้าน </a:t>
-            </a:r>
-            <a:r>
-              <a:rPr lang="en-US" sz="1800" i="0" dirty="0">
-                <a:effectLst/>
-                <a:ea typeface="Tahoma" panose="020B0604030504040204" pitchFamily="34" charset="0"/>
-                <a:cs typeface="Tahoma" panose="020B0604030504040204" pitchFamily="34" charset="0"/>
-              </a:rPr>
-              <a:t>NLP</a:t>
-            </a:r>
-            <a:endParaRPr lang="en-US" sz="1800" dirty="0"/>
-          </a:p>
-          <a:p>
-            <a:endParaRPr lang="en-US" sz="1800" dirty="0"/>
-          </a:p>
-        </p:txBody>
-      </p:sp>
       <p:sp>
         <p:nvSpPr>
           <p:cNvPr id="12" name="Rectangle 11">
@@ -9498,6 +9370,341 @@
           </a:p>
         </p:txBody>
       </p:sp>
+      <p:sp>
+        <p:nvSpPr>
+          <p:cNvPr id="21" name="ชื่อเรื่อง 1">
+            <a:extLst>
+              <a:ext uri="{FF2B5EF4-FFF2-40B4-BE49-F238E27FC236}">
+                <a16:creationId xmlns:a16="http://schemas.microsoft.com/office/drawing/2014/main" id="{447CDBEC-EB07-496A-94A3-D9EAC70D34F8}"/>
+              </a:ext>
+            </a:extLst>
+          </p:cNvPr>
+          <p:cNvSpPr txBox="1">
+            <a:spLocks/>
+          </p:cNvSpPr>
+          <p:nvPr/>
+        </p:nvSpPr>
+        <p:spPr>
+          <a:xfrm>
+            <a:off x="554982" y="786847"/>
+            <a:ext cx="3387106" cy="1645501"/>
+          </a:xfrm>
+          <a:prstGeom prst="rect">
+            <a:avLst/>
+          </a:prstGeom>
+        </p:spPr>
+        <p:txBody>
+          <a:bodyPr vert="horz" lIns="91440" tIns="45720" rIns="91440" bIns="45720" rtlCol="0" anchor="ctr">
+            <a:normAutofit/>
+          </a:bodyPr>
+          <a:lstStyle>
+            <a:lvl1pPr algn="l" defTabSz="914400" rtl="0" eaLnBrk="1" latinLnBrk="0" hangingPunct="1">
+              <a:lnSpc>
+                <a:spcPct val="90000"/>
+              </a:lnSpc>
+              <a:spcBef>
+                <a:spcPct val="0"/>
+              </a:spcBef>
+              <a:buNone/>
+              <a:defRPr sz="4400" kern="1200">
+                <a:solidFill>
+                  <a:schemeClr val="tx1"/>
+                </a:solidFill>
+                <a:latin typeface="+mj-lt"/>
+                <a:ea typeface="+mj-ea"/>
+                <a:cs typeface="+mj-cs"/>
+              </a:defRPr>
+            </a:lvl1pPr>
+          </a:lstStyle>
+          <a:p>
+            <a:pPr algn="ctr"/>
+            <a:r>
+              <a:rPr lang="en-US" b="1">
+                <a:solidFill>
+                  <a:schemeClr val="bg1"/>
+                </a:solidFill>
+                <a:latin typeface="+mn-lt"/>
+                <a:ea typeface="Tahoma" panose="020B0604030504040204" pitchFamily="34" charset="0"/>
+                <a:cs typeface="Tahoma" panose="020B0604030504040204" pitchFamily="34" charset="0"/>
+              </a:rPr>
+              <a:t>NLP</a:t>
+            </a:r>
+            <a:endParaRPr lang="en-US" dirty="0">
+              <a:solidFill>
+                <a:schemeClr val="bg1"/>
+              </a:solidFill>
+              <a:latin typeface="+mn-lt"/>
+            </a:endParaRPr>
+          </a:p>
+        </p:txBody>
+      </p:sp>
+      <p:sp>
+        <p:nvSpPr>
+          <p:cNvPr id="22" name="ตัวแทนเนื้อหา 2">
+            <a:extLst>
+              <a:ext uri="{FF2B5EF4-FFF2-40B4-BE49-F238E27FC236}">
+                <a16:creationId xmlns:a16="http://schemas.microsoft.com/office/drawing/2014/main" id="{2101FF16-585C-4A16-BD45-B8BF8D0E37DD}"/>
+              </a:ext>
+            </a:extLst>
+          </p:cNvPr>
+          <p:cNvSpPr txBox="1">
+            <a:spLocks/>
+          </p:cNvSpPr>
+          <p:nvPr/>
+        </p:nvSpPr>
+        <p:spPr>
+          <a:xfrm>
+            <a:off x="554983" y="2442658"/>
+            <a:ext cx="3387105" cy="3628495"/>
+          </a:xfrm>
+          <a:prstGeom prst="rect">
+            <a:avLst/>
+          </a:prstGeom>
+        </p:spPr>
+        <p:txBody>
+          <a:bodyPr vert="horz" lIns="91440" tIns="45720" rIns="91440" bIns="45720" rtlCol="0">
+            <a:normAutofit/>
+          </a:bodyPr>
+          <a:lstStyle>
+            <a:lvl1pPr marL="228600" indent="-228600" algn="l" defTabSz="914400" rtl="0" eaLnBrk="1" latinLnBrk="0" hangingPunct="1">
+              <a:lnSpc>
+                <a:spcPct val="90000"/>
+              </a:lnSpc>
+              <a:spcBef>
+                <a:spcPts val="1000"/>
+              </a:spcBef>
+              <a:buFont typeface="Arial" panose="020B0604020202020204" pitchFamily="34" charset="0"/>
+              <a:buChar char="•"/>
+              <a:defRPr sz="2800" kern="1200">
+                <a:solidFill>
+                  <a:schemeClr val="tx1"/>
+                </a:solidFill>
+                <a:latin typeface="+mn-lt"/>
+                <a:ea typeface="+mn-ea"/>
+                <a:cs typeface="+mn-cs"/>
+              </a:defRPr>
+            </a:lvl1pPr>
+            <a:lvl2pPr marL="685800" indent="-228600" algn="l" defTabSz="914400" rtl="0" eaLnBrk="1" latinLnBrk="0" hangingPunct="1">
+              <a:lnSpc>
+                <a:spcPct val="90000"/>
+              </a:lnSpc>
+              <a:spcBef>
+                <a:spcPts val="500"/>
+              </a:spcBef>
+              <a:buFont typeface="Arial" panose="020B0604020202020204" pitchFamily="34" charset="0"/>
+              <a:buChar char="•"/>
+              <a:defRPr sz="2400" kern="1200">
+                <a:solidFill>
+                  <a:schemeClr val="tx1"/>
+                </a:solidFill>
+                <a:latin typeface="+mn-lt"/>
+                <a:ea typeface="+mn-ea"/>
+                <a:cs typeface="+mn-cs"/>
+              </a:defRPr>
+            </a:lvl2pPr>
+            <a:lvl3pPr marL="1143000" indent="-228600" algn="l" defTabSz="914400" rtl="0" eaLnBrk="1" latinLnBrk="0" hangingPunct="1">
+              <a:lnSpc>
+                <a:spcPct val="90000"/>
+              </a:lnSpc>
+              <a:spcBef>
+                <a:spcPts val="500"/>
+              </a:spcBef>
+              <a:buFont typeface="Arial" panose="020B0604020202020204" pitchFamily="34" charset="0"/>
+              <a:buChar char="•"/>
+              <a:defRPr sz="2000" kern="1200">
+                <a:solidFill>
+                  <a:schemeClr val="tx1"/>
+                </a:solidFill>
+                <a:latin typeface="+mn-lt"/>
+                <a:ea typeface="+mn-ea"/>
+                <a:cs typeface="+mn-cs"/>
+              </a:defRPr>
+            </a:lvl3pPr>
+            <a:lvl4pPr marL="1600200" indent="-228600" algn="l" defTabSz="914400" rtl="0" eaLnBrk="1" latinLnBrk="0" hangingPunct="1">
+              <a:lnSpc>
+                <a:spcPct val="90000"/>
+              </a:lnSpc>
+              <a:spcBef>
+                <a:spcPts val="500"/>
+              </a:spcBef>
+              <a:buFont typeface="Arial" panose="020B0604020202020204" pitchFamily="34" charset="0"/>
+              <a:buChar char="•"/>
+              <a:defRPr sz="1800" kern="1200">
+                <a:solidFill>
+                  <a:schemeClr val="tx1"/>
+                </a:solidFill>
+                <a:latin typeface="+mn-lt"/>
+                <a:ea typeface="+mn-ea"/>
+                <a:cs typeface="+mn-cs"/>
+              </a:defRPr>
+            </a:lvl4pPr>
+            <a:lvl5pPr marL="2057400" indent="-228600" algn="l" defTabSz="914400" rtl="0" eaLnBrk="1" latinLnBrk="0" hangingPunct="1">
+              <a:lnSpc>
+                <a:spcPct val="90000"/>
+              </a:lnSpc>
+              <a:spcBef>
+                <a:spcPts val="500"/>
+              </a:spcBef>
+              <a:buFont typeface="Arial" panose="020B0604020202020204" pitchFamily="34" charset="0"/>
+              <a:buChar char="•"/>
+              <a:defRPr sz="1800" kern="1200">
+                <a:solidFill>
+                  <a:schemeClr val="tx1"/>
+                </a:solidFill>
+                <a:latin typeface="+mn-lt"/>
+                <a:ea typeface="+mn-ea"/>
+                <a:cs typeface="+mn-cs"/>
+              </a:defRPr>
+            </a:lvl5pPr>
+            <a:lvl6pPr marL="2514600" indent="-228600" algn="l" defTabSz="914400" rtl="0" eaLnBrk="1" latinLnBrk="0" hangingPunct="1">
+              <a:lnSpc>
+                <a:spcPct val="90000"/>
+              </a:lnSpc>
+              <a:spcBef>
+                <a:spcPts val="500"/>
+              </a:spcBef>
+              <a:buFont typeface="Arial" panose="020B0604020202020204" pitchFamily="34" charset="0"/>
+              <a:buChar char="•"/>
+              <a:defRPr sz="1800" kern="1200">
+                <a:solidFill>
+                  <a:schemeClr val="tx1"/>
+                </a:solidFill>
+                <a:latin typeface="+mn-lt"/>
+                <a:ea typeface="+mn-ea"/>
+                <a:cs typeface="+mn-cs"/>
+              </a:defRPr>
+            </a:lvl6pPr>
+            <a:lvl7pPr marL="2971800" indent="-228600" algn="l" defTabSz="914400" rtl="0" eaLnBrk="1" latinLnBrk="0" hangingPunct="1">
+              <a:lnSpc>
+                <a:spcPct val="90000"/>
+              </a:lnSpc>
+              <a:spcBef>
+                <a:spcPts val="500"/>
+              </a:spcBef>
+              <a:buFont typeface="Arial" panose="020B0604020202020204" pitchFamily="34" charset="0"/>
+              <a:buChar char="•"/>
+              <a:defRPr sz="1800" kern="1200">
+                <a:solidFill>
+                  <a:schemeClr val="tx1"/>
+                </a:solidFill>
+                <a:latin typeface="+mn-lt"/>
+                <a:ea typeface="+mn-ea"/>
+                <a:cs typeface="+mn-cs"/>
+              </a:defRPr>
+            </a:lvl7pPr>
+            <a:lvl8pPr marL="3429000" indent="-228600" algn="l" defTabSz="914400" rtl="0" eaLnBrk="1" latinLnBrk="0" hangingPunct="1">
+              <a:lnSpc>
+                <a:spcPct val="90000"/>
+              </a:lnSpc>
+              <a:spcBef>
+                <a:spcPts val="500"/>
+              </a:spcBef>
+              <a:buFont typeface="Arial" panose="020B0604020202020204" pitchFamily="34" charset="0"/>
+              <a:buChar char="•"/>
+              <a:defRPr sz="1800" kern="1200">
+                <a:solidFill>
+                  <a:schemeClr val="tx1"/>
+                </a:solidFill>
+                <a:latin typeface="+mn-lt"/>
+                <a:ea typeface="+mn-ea"/>
+                <a:cs typeface="+mn-cs"/>
+              </a:defRPr>
+            </a:lvl8pPr>
+            <a:lvl9pPr marL="3886200" indent="-228600" algn="l" defTabSz="914400" rtl="0" eaLnBrk="1" latinLnBrk="0" hangingPunct="1">
+              <a:lnSpc>
+                <a:spcPct val="90000"/>
+              </a:lnSpc>
+              <a:spcBef>
+                <a:spcPts val="500"/>
+              </a:spcBef>
+              <a:buFont typeface="Arial" panose="020B0604020202020204" pitchFamily="34" charset="0"/>
+              <a:buChar char="•"/>
+              <a:defRPr sz="1800" kern="1200">
+                <a:solidFill>
+                  <a:schemeClr val="tx1"/>
+                </a:solidFill>
+                <a:latin typeface="+mn-lt"/>
+                <a:ea typeface="+mn-ea"/>
+                <a:cs typeface="+mn-cs"/>
+              </a:defRPr>
+            </a:lvl9pPr>
+          </a:lstStyle>
+          <a:p>
+            <a:pPr marL="0" indent="0" algn="ctr">
+              <a:lnSpc>
+                <a:spcPct val="200000"/>
+              </a:lnSpc>
+              <a:buFont typeface="Arial" panose="020B0604020202020204" pitchFamily="34" charset="0"/>
+              <a:buNone/>
+            </a:pPr>
+            <a:r>
+              <a:rPr lang="th-TH" sz="2000">
+                <a:solidFill>
+                  <a:schemeClr val="bg1"/>
+                </a:solidFill>
+                <a:ea typeface="Tahoma" panose="020B0604030504040204" pitchFamily="34" charset="0"/>
+                <a:cs typeface="Tahoma" panose="020B0604030504040204" pitchFamily="34" charset="0"/>
+              </a:rPr>
+              <a:t>ใช้ </a:t>
+            </a:r>
+            <a:r>
+              <a:rPr lang="en-US" sz="2000">
+                <a:solidFill>
+                  <a:schemeClr val="bg1"/>
+                </a:solidFill>
+                <a:ea typeface="Tahoma" panose="020B0604030504040204" pitchFamily="34" charset="0"/>
+                <a:cs typeface="Tahoma" panose="020B0604030504040204" pitchFamily="34" charset="0"/>
+              </a:rPr>
+              <a:t>Machine Learning Algorithms </a:t>
+            </a:r>
+            <a:r>
+              <a:rPr lang="th-TH" sz="2000">
+                <a:solidFill>
+                  <a:schemeClr val="bg1"/>
+                </a:solidFill>
+                <a:ea typeface="Tahoma" panose="020B0604030504040204" pitchFamily="34" charset="0"/>
+                <a:cs typeface="Tahoma" panose="020B0604030504040204" pitchFamily="34" charset="0"/>
+              </a:rPr>
+              <a:t>กับข้อมูลประเภท </a:t>
+            </a:r>
+            <a:r>
+              <a:rPr lang="en-US" sz="2000">
+                <a:solidFill>
+                  <a:schemeClr val="bg1"/>
+                </a:solidFill>
+                <a:ea typeface="Tahoma" panose="020B0604030504040204" pitchFamily="34" charset="0"/>
+                <a:cs typeface="Tahoma" panose="020B0604030504040204" pitchFamily="34" charset="0"/>
+              </a:rPr>
+              <a:t>Text, Speech </a:t>
+            </a:r>
+            <a:r>
+              <a:rPr lang="th-TH" sz="2000">
+                <a:solidFill>
+                  <a:schemeClr val="bg1"/>
+                </a:solidFill>
+                <a:ea typeface="Tahoma" panose="020B0604030504040204" pitchFamily="34" charset="0"/>
+                <a:cs typeface="Tahoma" panose="020B0604030504040204" pitchFamily="34" charset="0"/>
+              </a:rPr>
+              <a:t>หรือแม้แต่ภาพ ซึ่งสามารถประยุกต์ใช้ในงานทางด้าน </a:t>
+            </a:r>
+            <a:r>
+              <a:rPr lang="en-US" sz="2000">
+                <a:solidFill>
+                  <a:schemeClr val="bg1"/>
+                </a:solidFill>
+                <a:ea typeface="Tahoma" panose="020B0604030504040204" pitchFamily="34" charset="0"/>
+                <a:cs typeface="Tahoma" panose="020B0604030504040204" pitchFamily="34" charset="0"/>
+              </a:rPr>
+              <a:t>NLP</a:t>
+            </a:r>
+            <a:endParaRPr lang="en-US" sz="2000" dirty="0">
+              <a:solidFill>
+                <a:schemeClr val="bg1"/>
+              </a:solidFill>
+            </a:endParaRPr>
+          </a:p>
+        </p:txBody>
+      </p:sp>
     </p:spTree>
     <p:extLst>
       <p:ext uri="{BB962C8B-B14F-4D97-AF65-F5344CB8AC3E}">
@@ -9512,890 +9719,6 @@
 </file>
 
 <file path=ppt/slides/slide5.xml><?xml version="1.0" encoding="utf-8"?>
-<p:sld xmlns:a="http://schemas.openxmlformats.org/drawingml/2006/main" xmlns:r="http://schemas.openxmlformats.org/officeDocument/2006/relationships" xmlns:p="http://schemas.openxmlformats.org/presentationml/2006/main">
-  <p:cSld>
-    <p:bg>
-      <p:bgPr>
-        <a:solidFill>
-          <a:schemeClr val="accent4">
-            <a:lumMod val="75000"/>
-          </a:schemeClr>
-        </a:solidFill>
-        <a:effectLst/>
-      </p:bgPr>
-    </p:bg>
-    <p:spTree>
-      <p:nvGrpSpPr>
-        <p:cNvPr id="1" name=""/>
-        <p:cNvGrpSpPr/>
-        <p:nvPr/>
-      </p:nvGrpSpPr>
-      <p:grpSpPr>
-        <a:xfrm>
-          <a:off x="0" y="0"/>
-          <a:ext cx="0" cy="0"/>
-          <a:chOff x="0" y="0"/>
-          <a:chExt cx="0" cy="0"/>
-        </a:xfrm>
-      </p:grpSpPr>
-      <p:sp>
-        <p:nvSpPr>
-          <p:cNvPr id="77" name="Rectangle 76">
-            <a:extLst>
-              <a:ext uri="{FF2B5EF4-FFF2-40B4-BE49-F238E27FC236}">
-                <a16:creationId xmlns:a16="http://schemas.microsoft.com/office/drawing/2014/main" id="{99CEE05D-F25C-4EC3-B527-D9C999E335CD}"/>
-              </a:ext>
-              <a:ext uri="{C183D7F6-B498-43B3-948B-1728B52AA6E4}">
-                <adec:decorative xmlns:adec="http://schemas.microsoft.com/office/drawing/2017/decorative" val="1"/>
-              </a:ext>
-            </a:extLst>
-          </p:cNvPr>
-          <p:cNvSpPr>
-            <a:spLocks noGrp="1" noRot="1" noChangeAspect="1" noMove="1" noResize="1" noEditPoints="1" noAdjustHandles="1" noChangeArrowheads="1" noChangeShapeType="1" noTextEdit="1"/>
-          </p:cNvSpPr>
-          <p:nvPr>
-            <p:extLst>
-              <p:ext uri="{386F3935-93C4-4BCD-93E2-E3B085C9AB24}">
-                <p16:designElem xmlns:p16="http://schemas.microsoft.com/office/powerpoint/2015/main" val="1"/>
-              </p:ext>
-            </p:extLst>
-          </p:nvPr>
-        </p:nvSpPr>
-        <p:spPr>
-          <a:xfrm>
-            <a:off x="0" y="0"/>
-            <a:ext cx="7536523" cy="6858000"/>
-          </a:xfrm>
-          <a:prstGeom prst="rect">
-            <a:avLst/>
-          </a:prstGeom>
-          <a:solidFill>
-            <a:srgbClr val="FFFFFF"/>
-          </a:solidFill>
-          <a:ln>
-            <a:noFill/>
-          </a:ln>
-        </p:spPr>
-        <p:style>
-          <a:lnRef idx="2">
-            <a:schemeClr val="accent1">
-              <a:shade val="50000"/>
-            </a:schemeClr>
-          </a:lnRef>
-          <a:fillRef idx="1">
-            <a:schemeClr val="accent1"/>
-          </a:fillRef>
-          <a:effectRef idx="0">
-            <a:schemeClr val="accent1"/>
-          </a:effectRef>
-          <a:fontRef idx="minor">
-            <a:schemeClr val="lt1"/>
-          </a:fontRef>
-        </p:style>
-        <p:txBody>
-          <a:bodyPr rtlCol="0" anchor="ctr"/>
-          <a:lstStyle/>
-          <a:p>
-            <a:pPr marL="0" marR="0" lvl="0" indent="0" algn="ctr" defTabSz="914400" rtl="0" eaLnBrk="1" fontAlgn="auto" latinLnBrk="0" hangingPunct="1">
-              <a:lnSpc>
-                <a:spcPct val="100000"/>
-              </a:lnSpc>
-              <a:spcBef>
-                <a:spcPts val="0"/>
-              </a:spcBef>
-              <a:spcAft>
-                <a:spcPts val="0"/>
-              </a:spcAft>
-              <a:buClrTx/>
-              <a:buSzTx/>
-              <a:buFontTx/>
-              <a:buNone/>
-              <a:tabLst/>
-              <a:defRPr/>
-            </a:pPr>
-            <a:endParaRPr kumimoji="0" lang="en-US" sz="1800" b="0" i="0" u="none" strike="noStrike" kern="1200" cap="none" spc="0" normalizeH="0" baseline="0" noProof="0" dirty="0">
-              <a:ln>
-                <a:noFill/>
-              </a:ln>
-              <a:solidFill>
-                <a:prstClr val="white"/>
-              </a:solidFill>
-              <a:effectLst/>
-              <a:uLnTx/>
-              <a:uFillTx/>
-              <a:latin typeface="Calibri" panose="020F0502020204030204"/>
-              <a:ea typeface="+mn-ea"/>
-              <a:cs typeface="+mn-cs"/>
-            </a:endParaRPr>
-          </a:p>
-        </p:txBody>
-      </p:sp>
-      <p:sp>
-        <p:nvSpPr>
-          <p:cNvPr id="79" name="Rectangle 78">
-            <a:extLst>
-              <a:ext uri="{FF2B5EF4-FFF2-40B4-BE49-F238E27FC236}">
-                <a16:creationId xmlns:a16="http://schemas.microsoft.com/office/drawing/2014/main" id="{4F036726-0C05-446E-91C3-B986EBEA055E}"/>
-              </a:ext>
-              <a:ext uri="{C183D7F6-B498-43B3-948B-1728B52AA6E4}">
-                <adec:decorative xmlns:adec="http://schemas.microsoft.com/office/drawing/2017/decorative" val="1"/>
-              </a:ext>
-            </a:extLst>
-          </p:cNvPr>
-          <p:cNvSpPr>
-            <a:spLocks noGrp="1" noRot="1" noChangeAspect="1" noMove="1" noResize="1" noEditPoints="1" noAdjustHandles="1" noChangeArrowheads="1" noChangeShapeType="1" noTextEdit="1"/>
-          </p:cNvSpPr>
-          <p:nvPr>
-            <p:extLst>
-              <p:ext uri="{386F3935-93C4-4BCD-93E2-E3B085C9AB24}">
-                <p16:designElem xmlns:p16="http://schemas.microsoft.com/office/powerpoint/2015/main" val="1"/>
-              </p:ext>
-            </p:extLst>
-          </p:nvPr>
-        </p:nvSpPr>
-        <p:spPr>
-          <a:xfrm>
-            <a:off x="417402" y="438538"/>
-            <a:ext cx="6710184" cy="6002060"/>
-          </a:xfrm>
-          <a:prstGeom prst="rect">
-            <a:avLst/>
-          </a:prstGeom>
-          <a:solidFill>
-            <a:schemeClr val="bg1">
-              <a:alpha val="40000"/>
-            </a:schemeClr>
-          </a:solidFill>
-          <a:ln w="6350" cap="flat" cmpd="sng" algn="ctr">
-            <a:noFill/>
-            <a:prstDash val="solid"/>
-          </a:ln>
-          <a:effectLst>
-            <a:softEdge rad="0"/>
-          </a:effectLst>
-        </p:spPr>
-      </p:sp>
-      <p:sp>
-        <p:nvSpPr>
-          <p:cNvPr id="81" name="Rectangle 80">
-            <a:extLst>
-              <a:ext uri="{FF2B5EF4-FFF2-40B4-BE49-F238E27FC236}">
-                <a16:creationId xmlns:a16="http://schemas.microsoft.com/office/drawing/2014/main" id="{A310ABCD-C34B-42D1-9BEB-47755A3EA36C}"/>
-              </a:ext>
-              <a:ext uri="{C183D7F6-B498-43B3-948B-1728B52AA6E4}">
-                <adec:decorative xmlns:adec="http://schemas.microsoft.com/office/drawing/2017/decorative" val="1"/>
-              </a:ext>
-            </a:extLst>
-          </p:cNvPr>
-          <p:cNvSpPr>
-            <a:spLocks noGrp="1" noRot="1" noChangeAspect="1" noMove="1" noResize="1" noEditPoints="1" noAdjustHandles="1" noChangeArrowheads="1" noChangeShapeType="1" noTextEdit="1"/>
-          </p:cNvSpPr>
-          <p:nvPr>
-            <p:extLst>
-              <p:ext uri="{386F3935-93C4-4BCD-93E2-E3B085C9AB24}">
-                <p16:designElem xmlns:p16="http://schemas.microsoft.com/office/powerpoint/2015/main" val="1"/>
-              </p:ext>
-            </p:extLst>
-          </p:nvPr>
-        </p:nvSpPr>
-        <p:spPr>
-          <a:xfrm>
-            <a:off x="626285" y="650014"/>
-            <a:ext cx="3367217" cy="3266022"/>
-          </a:xfrm>
-          <a:prstGeom prst="rect">
-            <a:avLst/>
-          </a:prstGeom>
-          <a:solidFill>
-            <a:srgbClr val="FFFFFF"/>
-          </a:solidFill>
-          <a:ln>
-            <a:noFill/>
-          </a:ln>
-        </p:spPr>
-        <p:style>
-          <a:lnRef idx="2">
-            <a:schemeClr val="accent1">
-              <a:shade val="50000"/>
-            </a:schemeClr>
-          </a:lnRef>
-          <a:fillRef idx="1">
-            <a:schemeClr val="accent1"/>
-          </a:fillRef>
-          <a:effectRef idx="0">
-            <a:schemeClr val="accent1"/>
-          </a:effectRef>
-          <a:fontRef idx="minor">
-            <a:schemeClr val="lt1"/>
-          </a:fontRef>
-        </p:style>
-        <p:txBody>
-          <a:bodyPr rtlCol="0" anchor="ctr"/>
-          <a:lstStyle/>
-          <a:p>
-            <a:pPr marL="0" marR="0" lvl="0" indent="0" algn="ctr" defTabSz="914400" rtl="0" eaLnBrk="1" fontAlgn="auto" latinLnBrk="0" hangingPunct="1">
-              <a:lnSpc>
-                <a:spcPct val="100000"/>
-              </a:lnSpc>
-              <a:spcBef>
-                <a:spcPts val="0"/>
-              </a:spcBef>
-              <a:spcAft>
-                <a:spcPts val="0"/>
-              </a:spcAft>
-              <a:buClrTx/>
-              <a:buSzTx/>
-              <a:buFontTx/>
-              <a:buNone/>
-              <a:tabLst/>
-              <a:defRPr/>
-            </a:pPr>
-            <a:endParaRPr kumimoji="0" lang="en-US" sz="1800" b="0" i="0" u="none" strike="noStrike" kern="1200" cap="none" spc="0" normalizeH="0" baseline="0" noProof="0">
-              <a:ln>
-                <a:noFill/>
-              </a:ln>
-              <a:solidFill>
-                <a:prstClr val="white"/>
-              </a:solidFill>
-              <a:effectLst/>
-              <a:uLnTx/>
-              <a:uFillTx/>
-              <a:latin typeface="Calibri" panose="020F0502020204030204"/>
-              <a:ea typeface="+mn-ea"/>
-              <a:cs typeface="+mn-cs"/>
-            </a:endParaRPr>
-          </a:p>
-        </p:txBody>
-      </p:sp>
-      <p:pic>
-        <p:nvPicPr>
-          <p:cNvPr id="2050" name="Picture 2" descr="How to use Google Docs&amp;#39; speech-to-text feature - OIB News">
-            <a:extLst>
-              <a:ext uri="{FF2B5EF4-FFF2-40B4-BE49-F238E27FC236}">
-                <a16:creationId xmlns:a16="http://schemas.microsoft.com/office/drawing/2014/main" id="{87B901D9-5948-4C35-ADCA-F21C70D30DB3}"/>
-              </a:ext>
-            </a:extLst>
-          </p:cNvPr>
-          <p:cNvPicPr>
-            <a:picLocks noChangeAspect="1" noChangeArrowheads="1"/>
-          </p:cNvPicPr>
-          <p:nvPr/>
-        </p:nvPicPr>
-        <p:blipFill>
-          <a:blip r:embed="rId2">
-            <a:extLst>
-              <a:ext uri="{28A0092B-C50C-407E-A947-70E740481C1C}">
-                <a14:useLocalDpi xmlns:a14="http://schemas.microsoft.com/office/drawing/2010/main" val="0"/>
-              </a:ext>
-            </a:extLst>
-          </a:blip>
-          <a:stretch>
-            <a:fillRect/>
-          </a:stretch>
-        </p:blipFill>
-        <p:spPr bwMode="auto">
-          <a:xfrm>
-            <a:off x="798460" y="1571661"/>
-            <a:ext cx="3044697" cy="1423779"/>
-          </a:xfrm>
-          <a:prstGeom prst="rect">
-            <a:avLst/>
-          </a:prstGeom>
-          <a:extLst>
-            <a:ext uri="{909E8E84-426E-40DD-AFC4-6F175D3DCCD1}">
-              <a14:hiddenFill xmlns:a14="http://schemas.microsoft.com/office/drawing/2010/main">
-                <a:solidFill>
-                  <a:srgbClr val="FFFFFF"/>
-                </a:solidFill>
-              </a14:hiddenFill>
-            </a:ext>
-          </a:extLst>
-        </p:spPr>
-      </p:pic>
-      <p:sp>
-        <p:nvSpPr>
-          <p:cNvPr id="83" name="Rectangle 82">
-            <a:extLst>
-              <a:ext uri="{FF2B5EF4-FFF2-40B4-BE49-F238E27FC236}">
-                <a16:creationId xmlns:a16="http://schemas.microsoft.com/office/drawing/2014/main" id="{F38AB6A2-89F7-43B5-B608-50DFC740DEBF}"/>
-              </a:ext>
-              <a:ext uri="{C183D7F6-B498-43B3-948B-1728B52AA6E4}">
-                <adec:decorative xmlns:adec="http://schemas.microsoft.com/office/drawing/2017/decorative" val="1"/>
-              </a:ext>
-            </a:extLst>
-          </p:cNvPr>
-          <p:cNvSpPr>
-            <a:spLocks noGrp="1" noRot="1" noChangeAspect="1" noMove="1" noResize="1" noEditPoints="1" noAdjustHandles="1" noChangeArrowheads="1" noChangeShapeType="1" noTextEdit="1"/>
-          </p:cNvSpPr>
-          <p:nvPr>
-            <p:extLst>
-              <p:ext uri="{386F3935-93C4-4BCD-93E2-E3B085C9AB24}">
-                <p16:designElem xmlns:p16="http://schemas.microsoft.com/office/powerpoint/2015/main" val="1"/>
-              </p:ext>
-            </p:extLst>
-          </p:nvPr>
-        </p:nvSpPr>
-        <p:spPr>
-          <a:xfrm>
-            <a:off x="4152946" y="650014"/>
-            <a:ext cx="2765758" cy="2136734"/>
-          </a:xfrm>
-          <a:prstGeom prst="rect">
-            <a:avLst/>
-          </a:prstGeom>
-          <a:solidFill>
-            <a:srgbClr val="FFFFFF"/>
-          </a:solidFill>
-          <a:ln>
-            <a:noFill/>
-          </a:ln>
-        </p:spPr>
-        <p:style>
-          <a:lnRef idx="2">
-            <a:schemeClr val="accent1">
-              <a:shade val="50000"/>
-            </a:schemeClr>
-          </a:lnRef>
-          <a:fillRef idx="1">
-            <a:schemeClr val="accent1"/>
-          </a:fillRef>
-          <a:effectRef idx="0">
-            <a:schemeClr val="accent1"/>
-          </a:effectRef>
-          <a:fontRef idx="minor">
-            <a:schemeClr val="lt1"/>
-          </a:fontRef>
-        </p:style>
-        <p:txBody>
-          <a:bodyPr rtlCol="0" anchor="ctr"/>
-          <a:lstStyle/>
-          <a:p>
-            <a:pPr marL="0" marR="0" lvl="0" indent="0" algn="ctr" defTabSz="914400" rtl="0" eaLnBrk="1" fontAlgn="auto" latinLnBrk="0" hangingPunct="1">
-              <a:lnSpc>
-                <a:spcPct val="100000"/>
-              </a:lnSpc>
-              <a:spcBef>
-                <a:spcPts val="0"/>
-              </a:spcBef>
-              <a:spcAft>
-                <a:spcPts val="0"/>
-              </a:spcAft>
-              <a:buClrTx/>
-              <a:buSzTx/>
-              <a:buFontTx/>
-              <a:buNone/>
-              <a:tabLst/>
-              <a:defRPr/>
-            </a:pPr>
-            <a:endParaRPr kumimoji="0" lang="en-US" sz="1800" b="0" i="0" u="none" strike="noStrike" kern="1200" cap="none" spc="0" normalizeH="0" baseline="0" noProof="0">
-              <a:ln>
-                <a:noFill/>
-              </a:ln>
-              <a:solidFill>
-                <a:prstClr val="white"/>
-              </a:solidFill>
-              <a:effectLst/>
-              <a:uLnTx/>
-              <a:uFillTx/>
-              <a:latin typeface="Calibri" panose="020F0502020204030204"/>
-              <a:ea typeface="+mn-ea"/>
-              <a:cs typeface="+mn-cs"/>
-            </a:endParaRPr>
-          </a:p>
-        </p:txBody>
-      </p:sp>
-      <p:pic>
-        <p:nvPicPr>
-          <p:cNvPr id="2052" name="Picture 4" descr="Comparing Text Summarization Techniques | by Madhav Thaker | Medium">
-            <a:extLst>
-              <a:ext uri="{FF2B5EF4-FFF2-40B4-BE49-F238E27FC236}">
-                <a16:creationId xmlns:a16="http://schemas.microsoft.com/office/drawing/2014/main" id="{063FE226-FB23-4F76-B775-46FF60447D0F}"/>
-              </a:ext>
-            </a:extLst>
-          </p:cNvPr>
-          <p:cNvPicPr>
-            <a:picLocks noChangeAspect="1" noChangeArrowheads="1"/>
-          </p:cNvPicPr>
-          <p:nvPr/>
-        </p:nvPicPr>
-        <p:blipFill>
-          <a:blip r:embed="rId3">
-            <a:extLst>
-              <a:ext uri="{28A0092B-C50C-407E-A947-70E740481C1C}">
-                <a14:useLocalDpi xmlns:a14="http://schemas.microsoft.com/office/drawing/2010/main" val="0"/>
-              </a:ext>
-            </a:extLst>
-          </a:blip>
-          <a:stretch>
-            <a:fillRect/>
-          </a:stretch>
-        </p:blipFill>
-        <p:spPr bwMode="auto">
-          <a:xfrm>
-            <a:off x="4323497" y="846660"/>
-            <a:ext cx="2434338" cy="1138053"/>
-          </a:xfrm>
-          <a:prstGeom prst="rect">
-            <a:avLst/>
-          </a:prstGeom>
-          <a:extLst>
-            <a:ext uri="{909E8E84-426E-40DD-AFC4-6F175D3DCCD1}">
-              <a14:hiddenFill xmlns:a14="http://schemas.microsoft.com/office/drawing/2010/main">
-                <a:solidFill>
-                  <a:srgbClr val="FFFFFF"/>
-                </a:solidFill>
-              </a14:hiddenFill>
-            </a:ext>
-          </a:extLst>
-        </p:spPr>
-      </p:pic>
-      <p:sp>
-        <p:nvSpPr>
-          <p:cNvPr id="85" name="Rectangle 84">
-            <a:extLst>
-              <a:ext uri="{FF2B5EF4-FFF2-40B4-BE49-F238E27FC236}">
-                <a16:creationId xmlns:a16="http://schemas.microsoft.com/office/drawing/2014/main" id="{06585B74-DAF6-470E-B2F3-B5530A709AAC}"/>
-              </a:ext>
-              <a:ext uri="{C183D7F6-B498-43B3-948B-1728B52AA6E4}">
-                <adec:decorative xmlns:adec="http://schemas.microsoft.com/office/drawing/2017/decorative" val="1"/>
-              </a:ext>
-            </a:extLst>
-          </p:cNvPr>
-          <p:cNvSpPr>
-            <a:spLocks noGrp="1" noRot="1" noChangeAspect="1" noMove="1" noResize="1" noEditPoints="1" noAdjustHandles="1" noChangeArrowheads="1" noChangeShapeType="1" noTextEdit="1"/>
-          </p:cNvSpPr>
-          <p:nvPr>
-            <p:extLst>
-              <p:ext uri="{386F3935-93C4-4BCD-93E2-E3B085C9AB24}">
-                <p16:designElem xmlns:p16="http://schemas.microsoft.com/office/powerpoint/2015/main" val="1"/>
-              </p:ext>
-            </p:extLst>
-          </p:nvPr>
-        </p:nvSpPr>
-        <p:spPr>
-          <a:xfrm>
-            <a:off x="626285" y="4088215"/>
-            <a:ext cx="3367217" cy="2124857"/>
-          </a:xfrm>
-          <a:prstGeom prst="rect">
-            <a:avLst/>
-          </a:prstGeom>
-          <a:solidFill>
-            <a:srgbClr val="FFFFFF"/>
-          </a:solidFill>
-          <a:ln>
-            <a:noFill/>
-          </a:ln>
-        </p:spPr>
-        <p:style>
-          <a:lnRef idx="2">
-            <a:schemeClr val="accent1">
-              <a:shade val="50000"/>
-            </a:schemeClr>
-          </a:lnRef>
-          <a:fillRef idx="1">
-            <a:schemeClr val="accent1"/>
-          </a:fillRef>
-          <a:effectRef idx="0">
-            <a:schemeClr val="accent1"/>
-          </a:effectRef>
-          <a:fontRef idx="minor">
-            <a:schemeClr val="lt1"/>
-          </a:fontRef>
-        </p:style>
-        <p:txBody>
-          <a:bodyPr rtlCol="0" anchor="ctr"/>
-          <a:lstStyle/>
-          <a:p>
-            <a:pPr marL="0" marR="0" lvl="0" indent="0" algn="ctr" defTabSz="914400" rtl="0" eaLnBrk="1" fontAlgn="auto" latinLnBrk="0" hangingPunct="1">
-              <a:lnSpc>
-                <a:spcPct val="100000"/>
-              </a:lnSpc>
-              <a:spcBef>
-                <a:spcPts val="0"/>
-              </a:spcBef>
-              <a:spcAft>
-                <a:spcPts val="0"/>
-              </a:spcAft>
-              <a:buClrTx/>
-              <a:buSzTx/>
-              <a:buFontTx/>
-              <a:buNone/>
-              <a:tabLst/>
-              <a:defRPr/>
-            </a:pPr>
-            <a:endParaRPr kumimoji="0" lang="en-US" sz="1800" b="0" i="0" u="none" strike="noStrike" kern="1200" cap="none" spc="0" normalizeH="0" baseline="0" noProof="0">
-              <a:ln>
-                <a:noFill/>
-              </a:ln>
-              <a:solidFill>
-                <a:prstClr val="white"/>
-              </a:solidFill>
-              <a:effectLst/>
-              <a:uLnTx/>
-              <a:uFillTx/>
-              <a:latin typeface="Calibri" panose="020F0502020204030204"/>
-              <a:ea typeface="+mn-ea"/>
-              <a:cs typeface="+mn-cs"/>
-            </a:endParaRPr>
-          </a:p>
-        </p:txBody>
-      </p:sp>
-      <p:pic>
-        <p:nvPicPr>
-          <p:cNvPr id="2056" name="Picture 8" descr="Email Spam Filtering: An Implementation with Python and Scikit-learn -  KDnuggets">
-            <a:extLst>
-              <a:ext uri="{FF2B5EF4-FFF2-40B4-BE49-F238E27FC236}">
-                <a16:creationId xmlns:a16="http://schemas.microsoft.com/office/drawing/2014/main" id="{8BBE54C1-D65B-4105-8A85-772CEF400D3B}"/>
-              </a:ext>
-            </a:extLst>
-          </p:cNvPr>
-          <p:cNvPicPr>
-            <a:picLocks noChangeAspect="1" noChangeArrowheads="1"/>
-          </p:cNvPicPr>
-          <p:nvPr/>
-        </p:nvPicPr>
-        <p:blipFill>
-          <a:blip r:embed="rId4">
-            <a:extLst>
-              <a:ext uri="{28A0092B-C50C-407E-A947-70E740481C1C}">
-                <a14:useLocalDpi xmlns:a14="http://schemas.microsoft.com/office/drawing/2010/main" val="0"/>
-              </a:ext>
-            </a:extLst>
-          </a:blip>
-          <a:stretch>
-            <a:fillRect/>
-          </a:stretch>
-        </p:blipFill>
-        <p:spPr bwMode="auto">
-          <a:xfrm>
-            <a:off x="798460" y="4471925"/>
-            <a:ext cx="3044697" cy="1377725"/>
-          </a:xfrm>
-          <a:prstGeom prst="rect">
-            <a:avLst/>
-          </a:prstGeom>
-          <a:extLst>
-            <a:ext uri="{909E8E84-426E-40DD-AFC4-6F175D3DCCD1}">
-              <a14:hiddenFill xmlns:a14="http://schemas.microsoft.com/office/drawing/2010/main">
-                <a:solidFill>
-                  <a:srgbClr val="FFFFFF"/>
-                </a:solidFill>
-              </a14:hiddenFill>
-            </a:ext>
-          </a:extLst>
-        </p:spPr>
-      </p:pic>
-      <p:sp>
-        <p:nvSpPr>
-          <p:cNvPr id="87" name="Rectangle 86">
-            <a:extLst>
-              <a:ext uri="{FF2B5EF4-FFF2-40B4-BE49-F238E27FC236}">
-                <a16:creationId xmlns:a16="http://schemas.microsoft.com/office/drawing/2014/main" id="{30BAD96F-CE2F-4682-99B8-0DD9E6AE2BED}"/>
-              </a:ext>
-              <a:ext uri="{C183D7F6-B498-43B3-948B-1728B52AA6E4}">
-                <adec:decorative xmlns:adec="http://schemas.microsoft.com/office/drawing/2017/decorative" val="1"/>
-              </a:ext>
-            </a:extLst>
-          </p:cNvPr>
-          <p:cNvSpPr>
-            <a:spLocks noGrp="1" noRot="1" noChangeAspect="1" noMove="1" noResize="1" noEditPoints="1" noAdjustHandles="1" noChangeArrowheads="1" noChangeShapeType="1" noTextEdit="1"/>
-          </p:cNvSpPr>
-          <p:nvPr>
-            <p:extLst>
-              <p:ext uri="{386F3935-93C4-4BCD-93E2-E3B085C9AB24}">
-                <p16:designElem xmlns:p16="http://schemas.microsoft.com/office/powerpoint/2015/main" val="1"/>
-              </p:ext>
-            </p:extLst>
-          </p:nvPr>
-        </p:nvSpPr>
-        <p:spPr>
-          <a:xfrm>
-            <a:off x="4152946" y="2947051"/>
-            <a:ext cx="2765758" cy="3266022"/>
-          </a:xfrm>
-          <a:prstGeom prst="rect">
-            <a:avLst/>
-          </a:prstGeom>
-          <a:solidFill>
-            <a:srgbClr val="FFFFFF"/>
-          </a:solidFill>
-          <a:ln>
-            <a:noFill/>
-          </a:ln>
-        </p:spPr>
-        <p:style>
-          <a:lnRef idx="2">
-            <a:schemeClr val="accent1">
-              <a:shade val="50000"/>
-            </a:schemeClr>
-          </a:lnRef>
-          <a:fillRef idx="1">
-            <a:schemeClr val="accent1"/>
-          </a:fillRef>
-          <a:effectRef idx="0">
-            <a:schemeClr val="accent1"/>
-          </a:effectRef>
-          <a:fontRef idx="minor">
-            <a:schemeClr val="lt1"/>
-          </a:fontRef>
-        </p:style>
-        <p:txBody>
-          <a:bodyPr rtlCol="0" anchor="ctr"/>
-          <a:lstStyle/>
-          <a:p>
-            <a:pPr marL="0" marR="0" lvl="0" indent="0" algn="ctr" defTabSz="914400" rtl="0" eaLnBrk="1" fontAlgn="auto" latinLnBrk="0" hangingPunct="1">
-              <a:lnSpc>
-                <a:spcPct val="100000"/>
-              </a:lnSpc>
-              <a:spcBef>
-                <a:spcPts val="0"/>
-              </a:spcBef>
-              <a:spcAft>
-                <a:spcPts val="0"/>
-              </a:spcAft>
-              <a:buClrTx/>
-              <a:buSzTx/>
-              <a:buFontTx/>
-              <a:buNone/>
-              <a:tabLst/>
-              <a:defRPr/>
-            </a:pPr>
-            <a:endParaRPr kumimoji="0" lang="en-US" sz="1800" b="0" i="0" u="none" strike="noStrike" kern="1200" cap="none" spc="0" normalizeH="0" baseline="0" noProof="0">
-              <a:ln>
-                <a:noFill/>
-              </a:ln>
-              <a:solidFill>
-                <a:prstClr val="white"/>
-              </a:solidFill>
-              <a:effectLst/>
-              <a:uLnTx/>
-              <a:uFillTx/>
-              <a:latin typeface="Calibri" panose="020F0502020204030204"/>
-              <a:ea typeface="+mn-ea"/>
-              <a:cs typeface="+mn-cs"/>
-            </a:endParaRPr>
-          </a:p>
-        </p:txBody>
-      </p:sp>
-      <p:pic>
-        <p:nvPicPr>
-          <p:cNvPr id="2054" name="Picture 6" descr="Machine translation - Translation software - memoQ">
-            <a:extLst>
-              <a:ext uri="{FF2B5EF4-FFF2-40B4-BE49-F238E27FC236}">
-                <a16:creationId xmlns:a16="http://schemas.microsoft.com/office/drawing/2014/main" id="{6EC59058-0F12-4123-98AA-EDE62A6F7298}"/>
-              </a:ext>
-            </a:extLst>
-          </p:cNvPr>
-          <p:cNvPicPr>
-            <a:picLocks noChangeAspect="1" noChangeArrowheads="1"/>
-          </p:cNvPicPr>
-          <p:nvPr/>
-        </p:nvPicPr>
-        <p:blipFill>
-          <a:blip r:embed="rId5">
-            <a:extLst>
-              <a:ext uri="{28A0092B-C50C-407E-A947-70E740481C1C}">
-                <a14:useLocalDpi xmlns:a14="http://schemas.microsoft.com/office/drawing/2010/main" val="0"/>
-              </a:ext>
-            </a:extLst>
-          </a:blip>
-          <a:stretch>
-            <a:fillRect/>
-          </a:stretch>
-        </p:blipFill>
-        <p:spPr bwMode="auto">
-          <a:xfrm>
-            <a:off x="4323497" y="3966034"/>
-            <a:ext cx="2434338" cy="1217169"/>
-          </a:xfrm>
-          <a:prstGeom prst="rect">
-            <a:avLst/>
-          </a:prstGeom>
-          <a:extLst>
-            <a:ext uri="{909E8E84-426E-40DD-AFC4-6F175D3DCCD1}">
-              <a14:hiddenFill xmlns:a14="http://schemas.microsoft.com/office/drawing/2010/main">
-                <a:solidFill>
-                  <a:srgbClr val="FFFFFF"/>
-                </a:solidFill>
-              </a14:hiddenFill>
-            </a:ext>
-          </a:extLst>
-        </p:spPr>
-      </p:pic>
-      <p:sp>
-        <p:nvSpPr>
-          <p:cNvPr id="41" name="ตัวแทนเนื้อหา 2">
-            <a:extLst>
-              <a:ext uri="{FF2B5EF4-FFF2-40B4-BE49-F238E27FC236}">
-                <a16:creationId xmlns:a16="http://schemas.microsoft.com/office/drawing/2014/main" id="{4C74414C-B5BE-4CD3-9C77-F5800BB41ECB}"/>
-              </a:ext>
-            </a:extLst>
-          </p:cNvPr>
-          <p:cNvSpPr>
-            <a:spLocks noGrp="1"/>
-          </p:cNvSpPr>
-          <p:nvPr>
-            <p:ph idx="1"/>
-          </p:nvPr>
-        </p:nvSpPr>
-        <p:spPr>
-          <a:xfrm>
-            <a:off x="8014995" y="2623457"/>
-            <a:ext cx="3732245" cy="3589615"/>
-          </a:xfrm>
-        </p:spPr>
-        <p:txBody>
-          <a:bodyPr>
-            <a:normAutofit/>
-          </a:bodyPr>
-          <a:lstStyle/>
-          <a:p>
-            <a:pPr marL="0" indent="0">
-              <a:buNone/>
-            </a:pPr>
-            <a:r>
-              <a:rPr lang="en-US" sz="1800" b="1" i="0" dirty="0">
-                <a:effectLst/>
-                <a:latin typeface="Tahoma" panose="020B0604030504040204" pitchFamily="34" charset="0"/>
-                <a:ea typeface="Tahoma" panose="020B0604030504040204" pitchFamily="34" charset="0"/>
-                <a:cs typeface="Tahoma" panose="020B0604030504040204" pitchFamily="34" charset="0"/>
-              </a:rPr>
-              <a:t>NLP </a:t>
-            </a:r>
-          </a:p>
-          <a:p>
-            <a:pPr marL="0" indent="0">
-              <a:buNone/>
-            </a:pPr>
-            <a:r>
-              <a:rPr lang="th-TH" sz="1800" i="0" dirty="0">
-                <a:effectLst/>
-                <a:latin typeface="Tahoma" panose="020B0604030504040204" pitchFamily="34" charset="0"/>
-                <a:ea typeface="Tahoma" panose="020B0604030504040204" pitchFamily="34" charset="0"/>
-                <a:cs typeface="Tahoma" panose="020B0604030504040204" pitchFamily="34" charset="0"/>
-              </a:rPr>
-              <a:t>ใช้ </a:t>
-            </a:r>
-            <a:r>
-              <a:rPr lang="en-US" sz="1800" i="0" dirty="0">
-                <a:effectLst/>
-                <a:latin typeface="Tahoma" panose="020B0604030504040204" pitchFamily="34" charset="0"/>
-                <a:ea typeface="Tahoma" panose="020B0604030504040204" pitchFamily="34" charset="0"/>
-                <a:cs typeface="Tahoma" panose="020B0604030504040204" pitchFamily="34" charset="0"/>
-              </a:rPr>
-              <a:t>machine learning algorithms </a:t>
-            </a:r>
-            <a:r>
-              <a:rPr lang="th-TH" sz="1800" i="0" dirty="0">
-                <a:effectLst/>
-                <a:latin typeface="Tahoma" panose="020B0604030504040204" pitchFamily="34" charset="0"/>
-                <a:ea typeface="Tahoma" panose="020B0604030504040204" pitchFamily="34" charset="0"/>
-                <a:cs typeface="Tahoma" panose="020B0604030504040204" pitchFamily="34" charset="0"/>
-              </a:rPr>
-              <a:t>กับข้อมูลประเภท </a:t>
-            </a:r>
-            <a:r>
-              <a:rPr lang="en-US" sz="1800" i="0" dirty="0">
-                <a:effectLst/>
-                <a:latin typeface="Tahoma" panose="020B0604030504040204" pitchFamily="34" charset="0"/>
-                <a:ea typeface="Tahoma" panose="020B0604030504040204" pitchFamily="34" charset="0"/>
-                <a:cs typeface="Tahoma" panose="020B0604030504040204" pitchFamily="34" charset="0"/>
-              </a:rPr>
-              <a:t>text, speech </a:t>
-            </a:r>
-            <a:r>
-              <a:rPr lang="th-TH" sz="1800" i="0" dirty="0">
-                <a:effectLst/>
-                <a:latin typeface="Tahoma" panose="020B0604030504040204" pitchFamily="34" charset="0"/>
-                <a:ea typeface="Tahoma" panose="020B0604030504040204" pitchFamily="34" charset="0"/>
-                <a:cs typeface="Tahoma" panose="020B0604030504040204" pitchFamily="34" charset="0"/>
-              </a:rPr>
-              <a:t>หรือแม้แต่ภาพ ซึ่งสามารถประยุกต์ใช้ในงานทางด้าน </a:t>
-            </a:r>
-            <a:r>
-              <a:rPr lang="en-US" sz="1800" i="0" dirty="0">
-                <a:effectLst/>
-                <a:latin typeface="Tahoma" panose="020B0604030504040204" pitchFamily="34" charset="0"/>
-                <a:ea typeface="Tahoma" panose="020B0604030504040204" pitchFamily="34" charset="0"/>
-                <a:cs typeface="Tahoma" panose="020B0604030504040204" pitchFamily="34" charset="0"/>
-              </a:rPr>
-              <a:t>NLP</a:t>
-            </a:r>
-            <a:br>
-              <a:rPr lang="th-TH" sz="1800" dirty="0"/>
-            </a:br>
-            <a:endParaRPr lang="en-US" sz="1800" dirty="0"/>
-          </a:p>
-        </p:txBody>
-      </p:sp>
-      <p:sp>
-        <p:nvSpPr>
-          <p:cNvPr id="63" name="กล่องข้อความ 62">
-            <a:extLst>
-              <a:ext uri="{FF2B5EF4-FFF2-40B4-BE49-F238E27FC236}">
-                <a16:creationId xmlns:a16="http://schemas.microsoft.com/office/drawing/2014/main" id="{EA97829B-7ED9-42DE-B389-66FE28CDBD51}"/>
-              </a:ext>
-            </a:extLst>
-          </p:cNvPr>
-          <p:cNvSpPr txBox="1"/>
-          <p:nvPr/>
-        </p:nvSpPr>
-        <p:spPr>
-          <a:xfrm>
-            <a:off x="626285" y="5849650"/>
-            <a:ext cx="3367217" cy="297582"/>
-          </a:xfrm>
-          <a:prstGeom prst="rect">
-            <a:avLst/>
-          </a:prstGeom>
-          <a:noFill/>
-          <a:ln>
-            <a:noFill/>
-          </a:ln>
-        </p:spPr>
-        <p:txBody>
-          <a:bodyPr wrap="square" rtlCol="0">
-            <a:noAutofit/>
-          </a:bodyPr>
-          <a:lstStyle/>
-          <a:p>
-            <a:pPr algn="ctr">
-              <a:spcAft>
-                <a:spcPts val="600"/>
-              </a:spcAft>
-            </a:pPr>
-            <a:r>
-              <a:rPr lang="en-US" sz="1300" b="1" dirty="0">
-                <a:solidFill>
-                  <a:schemeClr val="bg1"/>
-                </a:solidFill>
-                <a:effectLst/>
-              </a:rPr>
-              <a:t>spam detection</a:t>
-            </a:r>
-            <a:endParaRPr lang="en-US" sz="1300" dirty="0">
-              <a:solidFill>
-                <a:schemeClr val="bg1"/>
-              </a:solidFill>
-            </a:endParaRPr>
-          </a:p>
-        </p:txBody>
-      </p:sp>
-    </p:spTree>
-    <p:extLst>
-      <p:ext uri="{BB962C8B-B14F-4D97-AF65-F5344CB8AC3E}">
-        <p14:creationId xmlns:p14="http://schemas.microsoft.com/office/powerpoint/2010/main" val="3368945576"/>
-      </p:ext>
-    </p:extLst>
-  </p:cSld>
-  <p:clrMapOvr>
-    <a:overrideClrMapping bg1="dk1" tx1="lt1" bg2="dk2" tx2="lt2" accent1="accent1" accent2="accent2" accent3="accent3" accent4="accent4" accent5="accent5" accent6="accent6" hlink="hlink" folHlink="folHlink"/>
-  </p:clrMapOvr>
-</p:sld>
-</file>
-
-<file path=ppt/slides/slide6.xml><?xml version="1.0" encoding="utf-8"?>
 <p:sld xmlns:a="http://schemas.openxmlformats.org/drawingml/2006/main" xmlns:r="http://schemas.openxmlformats.org/officeDocument/2006/relationships" xmlns:p="http://schemas.openxmlformats.org/presentationml/2006/main">
   <p:cSld>
     <p:bg>

</xml_diff>